<commit_message>
Updated Powerpoint Start Date
Since I've been back-and-forthing with Alan about the web link for our
site I'm sending everything out later than I had hoped, so I changed the
start date to tomorrow.
</commit_message>
<xml_diff>
--- a/Documentation/Testing_Plan_PLUVALI_presentation_one_slide.pptx
+++ b/Documentation/Testing_Plan_PLUVALI_presentation_one_slide.pptx
@@ -1,19 +1,114 @@
 
 <file path=ppt/presentation.xml><?xml version="1.0" encoding="utf-8"?>
-<p:presentation xmlns:a="http://schemas.openxmlformats.org/drawingml/2006/main" xmlns:p="http://schemas.openxmlformats.org/presentationml/2006/main" xmlns:r="http://schemas.openxmlformats.org/officeDocument/2006/relationships">
+<p:presentation xmlns:a="http://schemas.openxmlformats.org/drawingml/2006/main" xmlns:r="http://schemas.openxmlformats.org/officeDocument/2006/relationships" xmlns:p="http://schemas.openxmlformats.org/presentationml/2006/main">
   <p:sldMasterIdLst>
-    <p:sldMasterId id="2147483648" r:id="rId2"/>
+    <p:sldMasterId id="2147483648" r:id="rId1"/>
   </p:sldMasterIdLst>
   <p:sldIdLst>
-    <p:sldId id="256" r:id="rId3"/>
+    <p:sldId id="256" r:id="rId2"/>
   </p:sldIdLst>
-  <p:sldSz cx="9144000" cy="6858000"/>
+  <p:sldSz cx="9144000" cy="6858000" type="screen4x3"/>
   <p:notesSz cx="7772400" cy="10058400"/>
+  <p:defaultTextStyle>
+    <a:defPPr>
+      <a:defRPr lang="en-US"/>
+    </a:defPPr>
+    <a:lvl1pPr marL="0" algn="l" defTabSz="914400" rtl="0" eaLnBrk="1" latinLnBrk="0" hangingPunct="1">
+      <a:defRPr sz="1800" kern="1200">
+        <a:solidFill>
+          <a:schemeClr val="tx1"/>
+        </a:solidFill>
+        <a:latin typeface="+mn-lt"/>
+        <a:ea typeface="+mn-ea"/>
+        <a:cs typeface="+mn-cs"/>
+      </a:defRPr>
+    </a:lvl1pPr>
+    <a:lvl2pPr marL="457200" algn="l" defTabSz="914400" rtl="0" eaLnBrk="1" latinLnBrk="0" hangingPunct="1">
+      <a:defRPr sz="1800" kern="1200">
+        <a:solidFill>
+          <a:schemeClr val="tx1"/>
+        </a:solidFill>
+        <a:latin typeface="+mn-lt"/>
+        <a:ea typeface="+mn-ea"/>
+        <a:cs typeface="+mn-cs"/>
+      </a:defRPr>
+    </a:lvl2pPr>
+    <a:lvl3pPr marL="914400" algn="l" defTabSz="914400" rtl="0" eaLnBrk="1" latinLnBrk="0" hangingPunct="1">
+      <a:defRPr sz="1800" kern="1200">
+        <a:solidFill>
+          <a:schemeClr val="tx1"/>
+        </a:solidFill>
+        <a:latin typeface="+mn-lt"/>
+        <a:ea typeface="+mn-ea"/>
+        <a:cs typeface="+mn-cs"/>
+      </a:defRPr>
+    </a:lvl3pPr>
+    <a:lvl4pPr marL="1371600" algn="l" defTabSz="914400" rtl="0" eaLnBrk="1" latinLnBrk="0" hangingPunct="1">
+      <a:defRPr sz="1800" kern="1200">
+        <a:solidFill>
+          <a:schemeClr val="tx1"/>
+        </a:solidFill>
+        <a:latin typeface="+mn-lt"/>
+        <a:ea typeface="+mn-ea"/>
+        <a:cs typeface="+mn-cs"/>
+      </a:defRPr>
+    </a:lvl4pPr>
+    <a:lvl5pPr marL="1828800" algn="l" defTabSz="914400" rtl="0" eaLnBrk="1" latinLnBrk="0" hangingPunct="1">
+      <a:defRPr sz="1800" kern="1200">
+        <a:solidFill>
+          <a:schemeClr val="tx1"/>
+        </a:solidFill>
+        <a:latin typeface="+mn-lt"/>
+        <a:ea typeface="+mn-ea"/>
+        <a:cs typeface="+mn-cs"/>
+      </a:defRPr>
+    </a:lvl5pPr>
+    <a:lvl6pPr marL="2286000" algn="l" defTabSz="914400" rtl="0" eaLnBrk="1" latinLnBrk="0" hangingPunct="1">
+      <a:defRPr sz="1800" kern="1200">
+        <a:solidFill>
+          <a:schemeClr val="tx1"/>
+        </a:solidFill>
+        <a:latin typeface="+mn-lt"/>
+        <a:ea typeface="+mn-ea"/>
+        <a:cs typeface="+mn-cs"/>
+      </a:defRPr>
+    </a:lvl6pPr>
+    <a:lvl7pPr marL="2743200" algn="l" defTabSz="914400" rtl="0" eaLnBrk="1" latinLnBrk="0" hangingPunct="1">
+      <a:defRPr sz="1800" kern="1200">
+        <a:solidFill>
+          <a:schemeClr val="tx1"/>
+        </a:solidFill>
+        <a:latin typeface="+mn-lt"/>
+        <a:ea typeface="+mn-ea"/>
+        <a:cs typeface="+mn-cs"/>
+      </a:defRPr>
+    </a:lvl7pPr>
+    <a:lvl8pPr marL="3200400" algn="l" defTabSz="914400" rtl="0" eaLnBrk="1" latinLnBrk="0" hangingPunct="1">
+      <a:defRPr sz="1800" kern="1200">
+        <a:solidFill>
+          <a:schemeClr val="tx1"/>
+        </a:solidFill>
+        <a:latin typeface="+mn-lt"/>
+        <a:ea typeface="+mn-ea"/>
+        <a:cs typeface="+mn-cs"/>
+      </a:defRPr>
+    </a:lvl8pPr>
+    <a:lvl9pPr marL="3657600" algn="l" defTabSz="914400" rtl="0" eaLnBrk="1" latinLnBrk="0" hangingPunct="1">
+      <a:defRPr sz="1800" kern="1200">
+        <a:solidFill>
+          <a:schemeClr val="tx1"/>
+        </a:solidFill>
+        <a:latin typeface="+mn-lt"/>
+        <a:ea typeface="+mn-ea"/>
+        <a:cs typeface="+mn-cs"/>
+      </a:defRPr>
+    </a:lvl9pPr>
+  </p:defaultTextStyle>
 </p:presentation>
 </file>
 
 <file path=ppt/slideLayouts/slideLayout1.xml><?xml version="1.0" encoding="utf-8"?>
-<p:sldLayout xmlns:a="http://schemas.openxmlformats.org/drawingml/2006/main" xmlns:p="http://schemas.openxmlformats.org/presentationml/2006/main" xmlns:r="http://schemas.openxmlformats.org/officeDocument/2006/relationships" type="blank" preserve="1">
+<p:sldLayout xmlns:a="http://schemas.openxmlformats.org/drawingml/2006/main" xmlns:r="http://schemas.openxmlformats.org/officeDocument/2006/relationships" xmlns:p="http://schemas.openxmlformats.org/presentationml/2006/main" type="blank" preserve="1">
   <p:cSld name="Blank Slide">
     <p:spTree>
       <p:nvGrpSpPr>
@@ -31,11 +126,14 @@
       </p:grpSpPr>
     </p:spTree>
   </p:cSld>
+  <p:clrMapOvr>
+    <a:masterClrMapping/>
+  </p:clrMapOvr>
 </p:sldLayout>
 </file>
 
 <file path=ppt/slideLayouts/slideLayout10.xml><?xml version="1.0" encoding="utf-8"?>
-<p:sldLayout xmlns:a="http://schemas.openxmlformats.org/drawingml/2006/main" xmlns:p="http://schemas.openxmlformats.org/presentationml/2006/main" xmlns:r="http://schemas.openxmlformats.org/officeDocument/2006/relationships" type="objOverTx" preserve="1">
+<p:sldLayout xmlns:a="http://schemas.openxmlformats.org/drawingml/2006/main" xmlns:r="http://schemas.openxmlformats.org/officeDocument/2006/relationships" xmlns:p="http://schemas.openxmlformats.org/presentationml/2006/main" type="objOverTx" preserve="1">
   <p:cSld name="Title, Content over Content">
     <p:spTree>
       <p:nvGrpSpPr>
@@ -71,7 +169,8 @@
           </a:prstGeom>
         </p:spPr>
         <p:txBody>
-          <a:bodyPr lIns="0" rIns="0" tIns="0" bIns="0" anchor="ctr"/>
+          <a:bodyPr lIns="0" tIns="0" rIns="0" bIns="0" anchor="ctr"/>
+          <a:lstStyle/>
           <a:p>
             <a:pPr algn="ctr"/>
             <a:endParaRPr/>
@@ -98,7 +197,8 @@
           </a:prstGeom>
         </p:spPr>
         <p:txBody>
-          <a:bodyPr lIns="0" rIns="0" tIns="0" bIns="0"/>
+          <a:bodyPr lIns="0" tIns="0" rIns="0" bIns="0"/>
+          <a:lstStyle/>
           <a:p>
             <a:endParaRPr/>
           </a:p>
@@ -124,7 +224,8 @@
           </a:prstGeom>
         </p:spPr>
         <p:txBody>
-          <a:bodyPr lIns="0" rIns="0" tIns="0" bIns="0"/>
+          <a:bodyPr lIns="0" tIns="0" rIns="0" bIns="0"/>
+          <a:lstStyle/>
           <a:p>
             <a:endParaRPr/>
           </a:p>
@@ -132,11 +233,14 @@
       </p:sp>
     </p:spTree>
   </p:cSld>
+  <p:clrMapOvr>
+    <a:masterClrMapping/>
+  </p:clrMapOvr>
 </p:sldLayout>
 </file>
 
 <file path=ppt/slideLayouts/slideLayout11.xml><?xml version="1.0" encoding="utf-8"?>
-<p:sldLayout xmlns:a="http://schemas.openxmlformats.org/drawingml/2006/main" xmlns:p="http://schemas.openxmlformats.org/presentationml/2006/main" xmlns:r="http://schemas.openxmlformats.org/officeDocument/2006/relationships" type="fourObj" preserve="1">
+<p:sldLayout xmlns:a="http://schemas.openxmlformats.org/drawingml/2006/main" xmlns:r="http://schemas.openxmlformats.org/officeDocument/2006/relationships" xmlns:p="http://schemas.openxmlformats.org/presentationml/2006/main" type="fourObj" preserve="1">
   <p:cSld name="Title, 4 Content">
     <p:spTree>
       <p:nvGrpSpPr>
@@ -172,7 +276,8 @@
           </a:prstGeom>
         </p:spPr>
         <p:txBody>
-          <a:bodyPr lIns="0" rIns="0" tIns="0" bIns="0" anchor="ctr"/>
+          <a:bodyPr lIns="0" tIns="0" rIns="0" bIns="0" anchor="ctr"/>
+          <a:lstStyle/>
           <a:p>
             <a:pPr algn="ctr"/>
             <a:endParaRPr/>
@@ -199,7 +304,8 @@
           </a:prstGeom>
         </p:spPr>
         <p:txBody>
-          <a:bodyPr lIns="0" rIns="0" tIns="0" bIns="0"/>
+          <a:bodyPr lIns="0" tIns="0" rIns="0" bIns="0"/>
+          <a:lstStyle/>
           <a:p>
             <a:endParaRPr/>
           </a:p>
@@ -225,7 +331,8 @@
           </a:prstGeom>
         </p:spPr>
         <p:txBody>
-          <a:bodyPr lIns="0" rIns="0" tIns="0" bIns="0"/>
+          <a:bodyPr lIns="0" tIns="0" rIns="0" bIns="0"/>
+          <a:lstStyle/>
           <a:p>
             <a:endParaRPr/>
           </a:p>
@@ -251,7 +358,8 @@
           </a:prstGeom>
         </p:spPr>
         <p:txBody>
-          <a:bodyPr lIns="0" rIns="0" tIns="0" bIns="0"/>
+          <a:bodyPr lIns="0" tIns="0" rIns="0" bIns="0"/>
+          <a:lstStyle/>
           <a:p>
             <a:endParaRPr/>
           </a:p>
@@ -277,7 +385,8 @@
           </a:prstGeom>
         </p:spPr>
         <p:txBody>
-          <a:bodyPr lIns="0" rIns="0" tIns="0" bIns="0"/>
+          <a:bodyPr lIns="0" tIns="0" rIns="0" bIns="0"/>
+          <a:lstStyle/>
           <a:p>
             <a:endParaRPr/>
           </a:p>
@@ -285,11 +394,14 @@
       </p:sp>
     </p:spTree>
   </p:cSld>
+  <p:clrMapOvr>
+    <a:masterClrMapping/>
+  </p:clrMapOvr>
 </p:sldLayout>
 </file>
 
 <file path=ppt/slideLayouts/slideLayout12.xml><?xml version="1.0" encoding="utf-8"?>
-<p:sldLayout xmlns:a="http://schemas.openxmlformats.org/drawingml/2006/main" xmlns:p="http://schemas.openxmlformats.org/presentationml/2006/main" xmlns:r="http://schemas.openxmlformats.org/officeDocument/2006/relationships" type="blank" preserve="1">
+<p:sldLayout xmlns:a="http://schemas.openxmlformats.org/drawingml/2006/main" xmlns:r="http://schemas.openxmlformats.org/officeDocument/2006/relationships" xmlns:p="http://schemas.openxmlformats.org/presentationml/2006/main" type="blank" preserve="1">
   <p:cSld name="Title, 6 Content">
     <p:spTree>
       <p:nvGrpSpPr>
@@ -325,7 +437,8 @@
           </a:prstGeom>
         </p:spPr>
         <p:txBody>
-          <a:bodyPr lIns="0" rIns="0" tIns="0" bIns="0" anchor="ctr"/>
+          <a:bodyPr lIns="0" tIns="0" rIns="0" bIns="0" anchor="ctr"/>
+          <a:lstStyle/>
           <a:p>
             <a:pPr algn="ctr"/>
             <a:endParaRPr/>
@@ -352,7 +465,8 @@
           </a:prstGeom>
         </p:spPr>
         <p:txBody>
-          <a:bodyPr lIns="0" rIns="0" tIns="0" bIns="0"/>
+          <a:bodyPr lIns="0" tIns="0" rIns="0" bIns="0"/>
+          <a:lstStyle/>
           <a:p>
             <a:endParaRPr/>
           </a:p>
@@ -378,7 +492,8 @@
           </a:prstGeom>
         </p:spPr>
         <p:txBody>
-          <a:bodyPr lIns="0" rIns="0" tIns="0" bIns="0"/>
+          <a:bodyPr lIns="0" tIns="0" rIns="0" bIns="0"/>
+          <a:lstStyle/>
           <a:p>
             <a:endParaRPr/>
           </a:p>
@@ -386,12 +501,12 @@
       </p:sp>
       <p:pic>
         <p:nvPicPr>
-          <p:cNvPr id="36" name="" descr=""/>
+          <p:cNvPr id="36" name="Picture 35"/>
           <p:cNvPicPr/>
           <p:nvPr/>
         </p:nvPicPr>
         <p:blipFill>
-          <a:blip r:embed="rId2"/>
+          <a:blip r:embed="rId2" cstate="print"/>
           <a:stretch>
             <a:fillRect/>
           </a:stretch>
@@ -411,12 +526,12 @@
       </p:pic>
       <p:pic>
         <p:nvPicPr>
-          <p:cNvPr id="37" name="" descr=""/>
+          <p:cNvPr id="37" name="Picture 36"/>
           <p:cNvPicPr/>
           <p:nvPr/>
         </p:nvPicPr>
         <p:blipFill>
-          <a:blip r:embed="rId3"/>
+          <a:blip r:embed="rId2" cstate="print"/>
           <a:stretch>
             <a:fillRect/>
           </a:stretch>
@@ -436,11 +551,14 @@
       </p:pic>
     </p:spTree>
   </p:cSld>
+  <p:clrMapOvr>
+    <a:masterClrMapping/>
+  </p:clrMapOvr>
 </p:sldLayout>
 </file>
 
 <file path=ppt/slideLayouts/slideLayout2.xml><?xml version="1.0" encoding="utf-8"?>
-<p:sldLayout xmlns:a="http://schemas.openxmlformats.org/drawingml/2006/main" xmlns:p="http://schemas.openxmlformats.org/presentationml/2006/main" xmlns:r="http://schemas.openxmlformats.org/officeDocument/2006/relationships" type="tx" preserve="1">
+<p:sldLayout xmlns:a="http://schemas.openxmlformats.org/drawingml/2006/main" xmlns:r="http://schemas.openxmlformats.org/officeDocument/2006/relationships" xmlns:p="http://schemas.openxmlformats.org/presentationml/2006/main" type="tx" preserve="1">
   <p:cSld name="Title Slide">
     <p:spTree>
       <p:nvGrpSpPr>
@@ -476,7 +594,8 @@
           </a:prstGeom>
         </p:spPr>
         <p:txBody>
-          <a:bodyPr lIns="0" rIns="0" tIns="0" bIns="0" anchor="ctr"/>
+          <a:bodyPr lIns="0" tIns="0" rIns="0" bIns="0" anchor="ctr"/>
+          <a:lstStyle/>
           <a:p>
             <a:pPr algn="ctr"/>
             <a:endParaRPr/>
@@ -503,7 +622,8 @@
           </a:prstGeom>
         </p:spPr>
         <p:txBody>
-          <a:bodyPr lIns="0" rIns="0" tIns="0" bIns="0" anchor="ctr"/>
+          <a:bodyPr lIns="0" tIns="0" rIns="0" bIns="0" anchor="ctr"/>
+          <a:lstStyle/>
           <a:p>
             <a:pPr algn="ctr"/>
             <a:endParaRPr/>
@@ -512,11 +632,14 @@
       </p:sp>
     </p:spTree>
   </p:cSld>
+  <p:clrMapOvr>
+    <a:masterClrMapping/>
+  </p:clrMapOvr>
 </p:sldLayout>
 </file>
 
 <file path=ppt/slideLayouts/slideLayout3.xml><?xml version="1.0" encoding="utf-8"?>
-<p:sldLayout xmlns:a="http://schemas.openxmlformats.org/drawingml/2006/main" xmlns:p="http://schemas.openxmlformats.org/presentationml/2006/main" xmlns:r="http://schemas.openxmlformats.org/officeDocument/2006/relationships" type="obj" preserve="1">
+<p:sldLayout xmlns:a="http://schemas.openxmlformats.org/drawingml/2006/main" xmlns:r="http://schemas.openxmlformats.org/officeDocument/2006/relationships" xmlns:p="http://schemas.openxmlformats.org/presentationml/2006/main" type="obj" preserve="1">
   <p:cSld name="Title, Content">
     <p:spTree>
       <p:nvGrpSpPr>
@@ -552,7 +675,8 @@
           </a:prstGeom>
         </p:spPr>
         <p:txBody>
-          <a:bodyPr lIns="0" rIns="0" tIns="0" bIns="0" anchor="ctr"/>
+          <a:bodyPr lIns="0" tIns="0" rIns="0" bIns="0" anchor="ctr"/>
+          <a:lstStyle/>
           <a:p>
             <a:pPr algn="ctr"/>
             <a:endParaRPr/>
@@ -579,7 +703,8 @@
           </a:prstGeom>
         </p:spPr>
         <p:txBody>
-          <a:bodyPr lIns="0" rIns="0" tIns="0" bIns="0"/>
+          <a:bodyPr lIns="0" tIns="0" rIns="0" bIns="0"/>
+          <a:lstStyle/>
           <a:p>
             <a:endParaRPr/>
           </a:p>
@@ -587,11 +712,14 @@
       </p:sp>
     </p:spTree>
   </p:cSld>
+  <p:clrMapOvr>
+    <a:masterClrMapping/>
+  </p:clrMapOvr>
 </p:sldLayout>
 </file>
 
 <file path=ppt/slideLayouts/slideLayout4.xml><?xml version="1.0" encoding="utf-8"?>
-<p:sldLayout xmlns:a="http://schemas.openxmlformats.org/drawingml/2006/main" xmlns:p="http://schemas.openxmlformats.org/presentationml/2006/main" xmlns:r="http://schemas.openxmlformats.org/officeDocument/2006/relationships" type="twoObj" preserve="1">
+<p:sldLayout xmlns:a="http://schemas.openxmlformats.org/drawingml/2006/main" xmlns:r="http://schemas.openxmlformats.org/officeDocument/2006/relationships" xmlns:p="http://schemas.openxmlformats.org/presentationml/2006/main" type="twoObj" preserve="1">
   <p:cSld name="Title, 2 Content">
     <p:spTree>
       <p:nvGrpSpPr>
@@ -627,7 +755,8 @@
           </a:prstGeom>
         </p:spPr>
         <p:txBody>
-          <a:bodyPr lIns="0" rIns="0" tIns="0" bIns="0" anchor="ctr"/>
+          <a:bodyPr lIns="0" tIns="0" rIns="0" bIns="0" anchor="ctr"/>
+          <a:lstStyle/>
           <a:p>
             <a:pPr algn="ctr"/>
             <a:endParaRPr/>
@@ -654,7 +783,8 @@
           </a:prstGeom>
         </p:spPr>
         <p:txBody>
-          <a:bodyPr lIns="0" rIns="0" tIns="0" bIns="0"/>
+          <a:bodyPr lIns="0" tIns="0" rIns="0" bIns="0"/>
+          <a:lstStyle/>
           <a:p>
             <a:endParaRPr/>
           </a:p>
@@ -680,7 +810,8 @@
           </a:prstGeom>
         </p:spPr>
         <p:txBody>
-          <a:bodyPr lIns="0" rIns="0" tIns="0" bIns="0"/>
+          <a:bodyPr lIns="0" tIns="0" rIns="0" bIns="0"/>
+          <a:lstStyle/>
           <a:p>
             <a:endParaRPr/>
           </a:p>
@@ -688,11 +819,14 @@
       </p:sp>
     </p:spTree>
   </p:cSld>
+  <p:clrMapOvr>
+    <a:masterClrMapping/>
+  </p:clrMapOvr>
 </p:sldLayout>
 </file>
 
 <file path=ppt/slideLayouts/slideLayout5.xml><?xml version="1.0" encoding="utf-8"?>
-<p:sldLayout xmlns:a="http://schemas.openxmlformats.org/drawingml/2006/main" xmlns:p="http://schemas.openxmlformats.org/presentationml/2006/main" xmlns:r="http://schemas.openxmlformats.org/officeDocument/2006/relationships" type="titleOnly" preserve="1">
+<p:sldLayout xmlns:a="http://schemas.openxmlformats.org/drawingml/2006/main" xmlns:r="http://schemas.openxmlformats.org/officeDocument/2006/relationships" xmlns:p="http://schemas.openxmlformats.org/presentationml/2006/main" type="titleOnly" preserve="1">
   <p:cSld name="Title Only">
     <p:spTree>
       <p:nvGrpSpPr>
@@ -728,7 +862,8 @@
           </a:prstGeom>
         </p:spPr>
         <p:txBody>
-          <a:bodyPr lIns="0" rIns="0" tIns="0" bIns="0" anchor="ctr"/>
+          <a:bodyPr lIns="0" tIns="0" rIns="0" bIns="0" anchor="ctr"/>
+          <a:lstStyle/>
           <a:p>
             <a:pPr algn="ctr"/>
             <a:endParaRPr/>
@@ -737,11 +872,14 @@
       </p:sp>
     </p:spTree>
   </p:cSld>
+  <p:clrMapOvr>
+    <a:masterClrMapping/>
+  </p:clrMapOvr>
 </p:sldLayout>
 </file>
 
 <file path=ppt/slideLayouts/slideLayout6.xml><?xml version="1.0" encoding="utf-8"?>
-<p:sldLayout xmlns:a="http://schemas.openxmlformats.org/drawingml/2006/main" xmlns:p="http://schemas.openxmlformats.org/presentationml/2006/main" xmlns:r="http://schemas.openxmlformats.org/officeDocument/2006/relationships" type="objOnly" preserve="1">
+<p:sldLayout xmlns:a="http://schemas.openxmlformats.org/drawingml/2006/main" xmlns:r="http://schemas.openxmlformats.org/officeDocument/2006/relationships" xmlns:p="http://schemas.openxmlformats.org/presentationml/2006/main" type="objOnly" preserve="1">
   <p:cSld name="Centered Text">
     <p:spTree>
       <p:nvGrpSpPr>
@@ -777,7 +915,8 @@
           </a:prstGeom>
         </p:spPr>
         <p:txBody>
-          <a:bodyPr lIns="0" rIns="0" tIns="0" bIns="0" anchor="ctr"/>
+          <a:bodyPr lIns="0" tIns="0" rIns="0" bIns="0" anchor="ctr"/>
+          <a:lstStyle/>
           <a:p>
             <a:pPr algn="ctr"/>
             <a:endParaRPr/>
@@ -786,11 +925,14 @@
       </p:sp>
     </p:spTree>
   </p:cSld>
+  <p:clrMapOvr>
+    <a:masterClrMapping/>
+  </p:clrMapOvr>
 </p:sldLayout>
 </file>
 
 <file path=ppt/slideLayouts/slideLayout7.xml><?xml version="1.0" encoding="utf-8"?>
-<p:sldLayout xmlns:a="http://schemas.openxmlformats.org/drawingml/2006/main" xmlns:p="http://schemas.openxmlformats.org/presentationml/2006/main" xmlns:r="http://schemas.openxmlformats.org/officeDocument/2006/relationships" type="twoObjAndObj" preserve="1">
+<p:sldLayout xmlns:a="http://schemas.openxmlformats.org/drawingml/2006/main" xmlns:r="http://schemas.openxmlformats.org/officeDocument/2006/relationships" xmlns:p="http://schemas.openxmlformats.org/presentationml/2006/main" type="twoObjAndObj" preserve="1">
   <p:cSld name="Title, 2 Content and Content">
     <p:spTree>
       <p:nvGrpSpPr>
@@ -826,7 +968,8 @@
           </a:prstGeom>
         </p:spPr>
         <p:txBody>
-          <a:bodyPr lIns="0" rIns="0" tIns="0" bIns="0" anchor="ctr"/>
+          <a:bodyPr lIns="0" tIns="0" rIns="0" bIns="0" anchor="ctr"/>
+          <a:lstStyle/>
           <a:p>
             <a:pPr algn="ctr"/>
             <a:endParaRPr/>
@@ -853,7 +996,8 @@
           </a:prstGeom>
         </p:spPr>
         <p:txBody>
-          <a:bodyPr lIns="0" rIns="0" tIns="0" bIns="0"/>
+          <a:bodyPr lIns="0" tIns="0" rIns="0" bIns="0"/>
+          <a:lstStyle/>
           <a:p>
             <a:endParaRPr/>
           </a:p>
@@ -879,7 +1023,8 @@
           </a:prstGeom>
         </p:spPr>
         <p:txBody>
-          <a:bodyPr lIns="0" rIns="0" tIns="0" bIns="0"/>
+          <a:bodyPr lIns="0" tIns="0" rIns="0" bIns="0"/>
+          <a:lstStyle/>
           <a:p>
             <a:endParaRPr/>
           </a:p>
@@ -905,7 +1050,8 @@
           </a:prstGeom>
         </p:spPr>
         <p:txBody>
-          <a:bodyPr lIns="0" rIns="0" tIns="0" bIns="0"/>
+          <a:bodyPr lIns="0" tIns="0" rIns="0" bIns="0"/>
+          <a:lstStyle/>
           <a:p>
             <a:endParaRPr/>
           </a:p>
@@ -913,11 +1059,14 @@
       </p:sp>
     </p:spTree>
   </p:cSld>
+  <p:clrMapOvr>
+    <a:masterClrMapping/>
+  </p:clrMapOvr>
 </p:sldLayout>
 </file>
 
 <file path=ppt/slideLayouts/slideLayout8.xml><?xml version="1.0" encoding="utf-8"?>
-<p:sldLayout xmlns:a="http://schemas.openxmlformats.org/drawingml/2006/main" xmlns:p="http://schemas.openxmlformats.org/presentationml/2006/main" xmlns:r="http://schemas.openxmlformats.org/officeDocument/2006/relationships" type="objAndTwoObj" preserve="1">
+<p:sldLayout xmlns:a="http://schemas.openxmlformats.org/drawingml/2006/main" xmlns:r="http://schemas.openxmlformats.org/officeDocument/2006/relationships" xmlns:p="http://schemas.openxmlformats.org/presentationml/2006/main" type="objAndTwoObj" preserve="1">
   <p:cSld name="Title Content and 2 Content">
     <p:spTree>
       <p:nvGrpSpPr>
@@ -953,7 +1102,8 @@
           </a:prstGeom>
         </p:spPr>
         <p:txBody>
-          <a:bodyPr lIns="0" rIns="0" tIns="0" bIns="0" anchor="ctr"/>
+          <a:bodyPr lIns="0" tIns="0" rIns="0" bIns="0" anchor="ctr"/>
+          <a:lstStyle/>
           <a:p>
             <a:pPr algn="ctr"/>
             <a:endParaRPr/>
@@ -980,7 +1130,8 @@
           </a:prstGeom>
         </p:spPr>
         <p:txBody>
-          <a:bodyPr lIns="0" rIns="0" tIns="0" bIns="0"/>
+          <a:bodyPr lIns="0" tIns="0" rIns="0" bIns="0"/>
+          <a:lstStyle/>
           <a:p>
             <a:endParaRPr/>
           </a:p>
@@ -1006,7 +1157,8 @@
           </a:prstGeom>
         </p:spPr>
         <p:txBody>
-          <a:bodyPr lIns="0" rIns="0" tIns="0" bIns="0"/>
+          <a:bodyPr lIns="0" tIns="0" rIns="0" bIns="0"/>
+          <a:lstStyle/>
           <a:p>
             <a:endParaRPr/>
           </a:p>
@@ -1032,7 +1184,8 @@
           </a:prstGeom>
         </p:spPr>
         <p:txBody>
-          <a:bodyPr lIns="0" rIns="0" tIns="0" bIns="0"/>
+          <a:bodyPr lIns="0" tIns="0" rIns="0" bIns="0"/>
+          <a:lstStyle/>
           <a:p>
             <a:endParaRPr/>
           </a:p>
@@ -1040,11 +1193,14 @@
       </p:sp>
     </p:spTree>
   </p:cSld>
+  <p:clrMapOvr>
+    <a:masterClrMapping/>
+  </p:clrMapOvr>
 </p:sldLayout>
 </file>
 
 <file path=ppt/slideLayouts/slideLayout9.xml><?xml version="1.0" encoding="utf-8"?>
-<p:sldLayout xmlns:a="http://schemas.openxmlformats.org/drawingml/2006/main" xmlns:p="http://schemas.openxmlformats.org/presentationml/2006/main" xmlns:r="http://schemas.openxmlformats.org/officeDocument/2006/relationships" type="twoObjOverTx" preserve="1">
+<p:sldLayout xmlns:a="http://schemas.openxmlformats.org/drawingml/2006/main" xmlns:r="http://schemas.openxmlformats.org/officeDocument/2006/relationships" xmlns:p="http://schemas.openxmlformats.org/presentationml/2006/main" type="twoObjOverTx" preserve="1">
   <p:cSld name="Title, 2 Content over Content">
     <p:spTree>
       <p:nvGrpSpPr>
@@ -1080,7 +1236,8 @@
           </a:prstGeom>
         </p:spPr>
         <p:txBody>
-          <a:bodyPr lIns="0" rIns="0" tIns="0" bIns="0" anchor="ctr"/>
+          <a:bodyPr lIns="0" tIns="0" rIns="0" bIns="0" anchor="ctr"/>
+          <a:lstStyle/>
           <a:p>
             <a:pPr algn="ctr"/>
             <a:endParaRPr/>
@@ -1107,7 +1264,8 @@
           </a:prstGeom>
         </p:spPr>
         <p:txBody>
-          <a:bodyPr lIns="0" rIns="0" tIns="0" bIns="0"/>
+          <a:bodyPr lIns="0" tIns="0" rIns="0" bIns="0"/>
+          <a:lstStyle/>
           <a:p>
             <a:endParaRPr/>
           </a:p>
@@ -1133,7 +1291,8 @@
           </a:prstGeom>
         </p:spPr>
         <p:txBody>
-          <a:bodyPr lIns="0" rIns="0" tIns="0" bIns="0"/>
+          <a:bodyPr lIns="0" tIns="0" rIns="0" bIns="0"/>
+          <a:lstStyle/>
           <a:p>
             <a:endParaRPr/>
           </a:p>
@@ -1159,7 +1318,8 @@
           </a:prstGeom>
         </p:spPr>
         <p:txBody>
-          <a:bodyPr lIns="0" rIns="0" tIns="0" bIns="0"/>
+          <a:bodyPr lIns="0" tIns="0" rIns="0" bIns="0"/>
+          <a:lstStyle/>
           <a:p>
             <a:endParaRPr/>
           </a:p>
@@ -1167,17 +1327,21 @@
       </p:sp>
     </p:spTree>
   </p:cSld>
+  <p:clrMapOvr>
+    <a:masterClrMapping/>
+  </p:clrMapOvr>
 </p:sldLayout>
 </file>
 
 <file path=ppt/slideMasters/slideMaster1.xml><?xml version="1.0" encoding="utf-8"?>
-<p:sldMaster xmlns:a="http://schemas.openxmlformats.org/drawingml/2006/main" xmlns:p="http://schemas.openxmlformats.org/presentationml/2006/main" xmlns:r="http://schemas.openxmlformats.org/officeDocument/2006/relationships">
+<p:sldMaster xmlns:a="http://schemas.openxmlformats.org/drawingml/2006/main" xmlns:r="http://schemas.openxmlformats.org/officeDocument/2006/relationships" xmlns:p="http://schemas.openxmlformats.org/presentationml/2006/main">
   <p:cSld>
     <p:bg>
       <p:bgPr>
         <a:solidFill>
-          <a:srgbClr val="ffffff"/>
+          <a:srgbClr val="FFFFFF"/>
         </a:solidFill>
+        <a:effectLst/>
       </p:bgPr>
     </p:bg>
     <p:spTree>
@@ -1196,7 +1360,7 @@
       </p:grpSpPr>
       <p:sp>
         <p:nvSpPr>
-          <p:cNvPr id="0" name="CustomShape 1"/>
+          <p:cNvPr id="4" name="CustomShape 1"/>
           <p:cNvSpPr/>
           <p:nvPr/>
         </p:nvSpPr>
@@ -1209,7 +1373,7 @@
             <a:avLst/>
           </a:prstGeom>
           <a:solidFill>
-            <a:srgbClr val="ffffff"/>
+            <a:srgbClr val="FFFFFF"/>
           </a:solidFill>
           <a:ln w="25560">
             <a:noFill/>
@@ -1218,7 +1382,7 @@
       </p:sp>
       <p:sp>
         <p:nvSpPr>
-          <p:cNvPr id="1" name="CustomShape 2"/>
+          <p:cNvPr id="5" name="CustomShape 2"/>
           <p:cNvSpPr/>
           <p:nvPr/>
         </p:nvSpPr>
@@ -1258,7 +1422,8 @@
           </a:prstGeom>
         </p:spPr>
         <p:txBody>
-          <a:bodyPr lIns="0" rIns="0" tIns="0" bIns="0" anchor="ctr"/>
+          <a:bodyPr lIns="0" tIns="0" rIns="0" bIns="0" anchor="ctr"/>
+          <a:lstStyle/>
           <a:p>
             <a:pPr algn="ctr"/>
             <a:r>
@@ -1291,7 +1456,8 @@
           </a:prstGeom>
         </p:spPr>
         <p:txBody>
-          <a:bodyPr lIns="0" rIns="0" tIns="0" bIns="0"/>
+          <a:bodyPr lIns="0" tIns="0" rIns="0" bIns="0"/>
+          <a:lstStyle/>
           <a:p>
             <a:pPr>
               <a:buSzPct val="45000"/>
@@ -1394,26 +1560,31 @@
       </p:sp>
     </p:spTree>
   </p:cSld>
-  <p:clrMap bg1="lt1" bg2="lt2" tx1="dk1" tx2="dk2" accent1="accent1" accent2="accent2" accent3="accent3" accent4="accent4" accent5="accent5" accent6="accent6" hlink="hlink" folHlink="folHlink"/>
+  <p:clrMap bg1="lt1" tx1="dk1" bg2="lt2" tx2="dk2" accent1="accent1" accent2="accent2" accent3="accent3" accent4="accent4" accent5="accent5" accent6="accent6" hlink="hlink" folHlink="folHlink"/>
   <p:sldLayoutIdLst>
-    <p:sldLayoutId id="2147483649" r:id="rId2"/>
-    <p:sldLayoutId id="2147483650" r:id="rId3"/>
-    <p:sldLayoutId id="2147483651" r:id="rId4"/>
-    <p:sldLayoutId id="2147483652" r:id="rId5"/>
-    <p:sldLayoutId id="2147483653" r:id="rId6"/>
-    <p:sldLayoutId id="2147483654" r:id="rId7"/>
-    <p:sldLayoutId id="2147483655" r:id="rId8"/>
-    <p:sldLayoutId id="2147483656" r:id="rId9"/>
-    <p:sldLayoutId id="2147483657" r:id="rId10"/>
-    <p:sldLayoutId id="2147483658" r:id="rId11"/>
-    <p:sldLayoutId id="2147483659" r:id="rId12"/>
-    <p:sldLayoutId id="2147483660" r:id="rId13"/>
+    <p:sldLayoutId id="2147483649" r:id="rId1"/>
+    <p:sldLayoutId id="2147483650" r:id="rId2"/>
+    <p:sldLayoutId id="2147483651" r:id="rId3"/>
+    <p:sldLayoutId id="2147483652" r:id="rId4"/>
+    <p:sldLayoutId id="2147483653" r:id="rId5"/>
+    <p:sldLayoutId id="2147483654" r:id="rId6"/>
+    <p:sldLayoutId id="2147483655" r:id="rId7"/>
+    <p:sldLayoutId id="2147483656" r:id="rId8"/>
+    <p:sldLayoutId id="2147483657" r:id="rId9"/>
+    <p:sldLayoutId id="2147483658" r:id="rId10"/>
+    <p:sldLayoutId id="2147483659" r:id="rId11"/>
+    <p:sldLayoutId id="2147483660" r:id="rId12"/>
   </p:sldLayoutIdLst>
+  <p:txStyles>
+    <p:titleStyle/>
+    <p:bodyStyle/>
+    <p:otherStyle/>
+  </p:txStyles>
 </p:sldMaster>
 </file>
 
 <file path=ppt/slides/slide1.xml><?xml version="1.0" encoding="utf-8"?>
-<p:sld xmlns:a="http://schemas.openxmlformats.org/drawingml/2006/main" xmlns:p="http://schemas.openxmlformats.org/presentationml/2006/main" xmlns:r="http://schemas.openxmlformats.org/officeDocument/2006/relationships">
+<p:sld xmlns:a="http://schemas.openxmlformats.org/drawingml/2006/main" xmlns:r="http://schemas.openxmlformats.org/officeDocument/2006/relationships" xmlns:p="http://schemas.openxmlformats.org/presentationml/2006/main">
   <p:cSld>
     <p:spTree>
       <p:nvGrpSpPr>
@@ -1449,7 +1620,8 @@
           </a:ln>
         </p:spPr>
         <p:txBody>
-          <a:bodyPr lIns="90000" rIns="45720" tIns="45000" bIns="45000" anchor="ctr"/>
+          <a:bodyPr lIns="90000" tIns="45000" rIns="45720" bIns="45000" anchor="ctr"/>
+          <a:lstStyle/>
           <a:p>
             <a:pPr>
               <a:lnSpc>
@@ -1457,22 +1629,13 @@
               </a:lnSpc>
             </a:pPr>
             <a:r>
-              <a:rPr b="1" lang="en-US" sz="4500">
+              <a:rPr lang="en-US" sz="4500" b="1">
                 <a:solidFill>
-                  <a:srgbClr val="f0ad00"/>
+                  <a:srgbClr val="F0AD00"/>
                 </a:solidFill>
                 <a:latin typeface="Corbel"/>
               </a:rPr>
-              <a:t>	</a:t>
-            </a:r>
-            <a:r>
-              <a:rPr b="1" lang="en-US" sz="4500">
-                <a:solidFill>
-                  <a:srgbClr val="f0ad00"/>
-                </a:solidFill>
-                <a:latin typeface="Corbel"/>
-              </a:rPr>
-              <a:t>Team Pluvali Testing Plan:</a:t>
+              <a:t>	Team Pluvali Testing Plan:</a:t>
             </a:r>
             <a:endParaRPr/>
           </a:p>
@@ -1498,7 +1661,8 @@
           </a:ln>
         </p:spPr>
         <p:txBody>
-          <a:bodyPr lIns="54720" rIns="90000" tIns="91440" bIns="45000"/>
+          <a:bodyPr lIns="54720" tIns="91440" rIns="90000" bIns="45000"/>
+          <a:lstStyle/>
           <a:p>
             <a:pPr>
               <a:lnSpc>
@@ -1553,14 +1717,15 @@
           </a:ln>
         </p:spPr>
         <p:txBody>
-          <a:bodyPr lIns="0" rIns="0" tIns="0" bIns="0"/>
+          <a:bodyPr lIns="0" tIns="0" rIns="0" bIns="0"/>
+          <a:lstStyle/>
           <a:p>
             <a:pPr>
               <a:lnSpc>
                 <a:spcPct val="100000"/>
               </a:lnSpc>
             </a:pPr>
-            <a:endParaRPr/>
+            <a:endParaRPr dirty="0"/>
           </a:p>
           <a:p>
             <a:pPr>
@@ -1569,98 +1734,82 @@
               </a:lnSpc>
             </a:pPr>
             <a:r>
-              <a:rPr lang="en-US" sz="2000">
+              <a:rPr lang="en-US" sz="2000" dirty="0">
                 <a:solidFill>
                   <a:srgbClr val="000000"/>
                 </a:solidFill>
                 <a:latin typeface="Corbel"/>
                 <a:ea typeface="Times New Roman"/>
               </a:rPr>
-              <a:t>	</a:t>
+              <a:t>	* </a:t>
             </a:r>
             <a:r>
-              <a:rPr lang="en-US" sz="2000">
+              <a:rPr lang="en-US" sz="2000" dirty="0" err="1">
                 <a:solidFill>
                   <a:srgbClr val="000000"/>
                 </a:solidFill>
                 <a:latin typeface="Corbel"/>
                 <a:ea typeface="Times New Roman"/>
               </a:rPr>
-              <a:t>* Pluvali will start testing start on November 26th, and continue until December 3rd. </a:t>
+              <a:t>Pluvali</a:t>
             </a:r>
-            <a:endParaRPr/>
-          </a:p>
-          <a:p>
-            <a:pPr>
-              <a:lnSpc>
-                <a:spcPct val="100000"/>
-              </a:lnSpc>
-            </a:pPr>
-            <a:endParaRPr/>
-          </a:p>
-          <a:p>
-            <a:pPr>
-              <a:lnSpc>
-                <a:spcPct val="100000"/>
-              </a:lnSpc>
-            </a:pPr>
             <a:r>
-              <a:rPr lang="en-US" sz="2000">
+              <a:rPr lang="en-US" sz="2000" dirty="0">
                 <a:solidFill>
                   <a:srgbClr val="000000"/>
                 </a:solidFill>
                 <a:latin typeface="Corbel"/>
                 <a:ea typeface="Times New Roman"/>
               </a:rPr>
-              <a:t>	</a:t>
+              <a:t> will start testing start on November </a:t>
             </a:r>
             <a:r>
-              <a:rPr lang="en-US" sz="2000">
+              <a:rPr lang="en-US" sz="2000" dirty="0" smtClean="0">
                 <a:solidFill>
                   <a:srgbClr val="000000"/>
                 </a:solidFill>
                 <a:latin typeface="Corbel"/>
                 <a:ea typeface="Times New Roman"/>
               </a:rPr>
-              <a:t>* The testers will include Debra, Katie, Pam, Eric, plus 3 to 5 people they personally choose from DDRC (the four of us will unofficially test it as well).</a:t>
+              <a:t>25th</a:t>
             </a:r>
-            <a:endParaRPr/>
-          </a:p>
-          <a:p>
-            <a:pPr>
-              <a:lnSpc>
-                <a:spcPct val="100000"/>
-              </a:lnSpc>
-            </a:pPr>
-            <a:endParaRPr/>
-          </a:p>
-          <a:p>
-            <a:pPr>
-              <a:lnSpc>
-                <a:spcPct val="100000"/>
-              </a:lnSpc>
-            </a:pPr>
             <a:r>
-              <a:rPr lang="en-US" sz="2000">
+              <a:rPr lang="en-US" sz="2000" dirty="0">
                 <a:solidFill>
                   <a:srgbClr val="000000"/>
                 </a:solidFill>
                 <a:latin typeface="Corbel"/>
                 <a:ea typeface="Times New Roman"/>
               </a:rPr>
-              <a:t>	</a:t>
+              <a:t>, and continue until December 3rd. </a:t>
             </a:r>
+            <a:endParaRPr dirty="0"/>
+          </a:p>
+          <a:p>
+            <a:pPr>
+              <a:lnSpc>
+                <a:spcPct val="100000"/>
+              </a:lnSpc>
+            </a:pPr>
+            <a:endParaRPr dirty="0"/>
+          </a:p>
+          <a:p>
+            <a:pPr>
+              <a:lnSpc>
+                <a:spcPct val="100000"/>
+              </a:lnSpc>
+            </a:pPr>
             <a:r>
-              <a:rPr lang="en-US" sz="2000">
+              <a:rPr lang="en-US" sz="2000" dirty="0">
                 <a:solidFill>
                   <a:srgbClr val="000000"/>
                 </a:solidFill>
                 <a:latin typeface="Corbel"/>
                 <a:ea typeface="Times New Roman"/>
               </a:rPr>
-              <a:t>* The website layout is pretty much complete, although there is still a little bit of functionality (such as earning points/tokens) that needs to be added. </a:t>
+              <a:t>	* The testers will include Debra, Katie, Pam, Eric, plus 3 to 5 people they personally choose from DDRC (the four of us will unofficially test it as well).</a:t>
             </a:r>
-            <a:endParaRPr/>
+            <a:endParaRPr dirty="0"/>
           </a:p>
           <a:p>
             <a:pPr>
@@ -1668,7 +1817,7 @@
                 <a:spcPct val="100000"/>
               </a:lnSpc>
             </a:pPr>
-            <a:endParaRPr/>
+            <a:endParaRPr dirty="0"/>
           </a:p>
           <a:p>
             <a:pPr>
@@ -1677,26 +1826,42 @@
               </a:lnSpc>
             </a:pPr>
             <a:r>
-              <a:rPr lang="en-US" sz="2000">
+              <a:rPr lang="en-US" sz="2000" dirty="0">
                 <a:solidFill>
                   <a:srgbClr val="000000"/>
                 </a:solidFill>
                 <a:latin typeface="Corbel"/>
                 <a:ea typeface="Times New Roman"/>
               </a:rPr>
-              <a:t>	</a:t>
+              <a:t>	* The website layout is pretty much complete, although there is still a little bit of functionality (such as earning points/tokens) that needs to be added. </a:t>
             </a:r>
+            <a:endParaRPr dirty="0"/>
+          </a:p>
+          <a:p>
+            <a:pPr>
+              <a:lnSpc>
+                <a:spcPct val="100000"/>
+              </a:lnSpc>
+            </a:pPr>
+            <a:endParaRPr dirty="0"/>
+          </a:p>
+          <a:p>
+            <a:pPr>
+              <a:lnSpc>
+                <a:spcPct val="100000"/>
+              </a:lnSpc>
+            </a:pPr>
             <a:r>
-              <a:rPr lang="en-US" sz="2000">
+              <a:rPr lang="en-US" sz="2000" dirty="0">
                 <a:solidFill>
                   <a:srgbClr val="000000"/>
                 </a:solidFill>
                 <a:latin typeface="Corbel"/>
                 <a:ea typeface="Times New Roman"/>
               </a:rPr>
-              <a:t>* The pages may also need additional aesthetic improvements; probably will wait until the second semester.</a:t>
+              <a:t>	* The pages may also need additional aesthetic improvements; probably will wait until the second semester.</a:t>
             </a:r>
-            <a:endParaRPr/>
+            <a:endParaRPr dirty="0"/>
           </a:p>
           <a:p>
             <a:pPr>
@@ -1704,7 +1869,7 @@
                 <a:spcPct val="100000"/>
               </a:lnSpc>
             </a:pPr>
-            <a:endParaRPr/>
+            <a:endParaRPr dirty="0"/>
           </a:p>
           <a:p>
             <a:pPr>
@@ -1713,26 +1878,16 @@
               </a:lnSpc>
             </a:pPr>
             <a:r>
-              <a:rPr lang="en-US" sz="2000">
+              <a:rPr lang="en-US" sz="2000" dirty="0">
                 <a:solidFill>
                   <a:srgbClr val="000000"/>
                 </a:solidFill>
                 <a:latin typeface="Corbel"/>
                 <a:ea typeface="Times New Roman"/>
               </a:rPr>
-              <a:t>	</a:t>
+              <a:t>	* Detailed instructions will be sent out in another document.</a:t>
             </a:r>
-            <a:r>
-              <a:rPr lang="en-US" sz="2000">
-                <a:solidFill>
-                  <a:srgbClr val="000000"/>
-                </a:solidFill>
-                <a:latin typeface="Corbel"/>
-                <a:ea typeface="Times New Roman"/>
-              </a:rPr>
-              <a:t>* Detailed instructions will be sent out in another document.</a:t>
-            </a:r>
-            <a:endParaRPr/>
+            <a:endParaRPr dirty="0"/>
           </a:p>
         </p:txBody>
       </p:sp>
@@ -1756,7 +1911,8 @@
           </a:ln>
         </p:spPr>
         <p:txBody>
-          <a:bodyPr lIns="90000" rIns="90000" tIns="45000" bIns="45000"/>
+          <a:bodyPr lIns="90000" tIns="45000" rIns="90000" bIns="45000"/>
+          <a:lstStyle/>
           <a:p>
             <a:pPr>
               <a:lnSpc>
@@ -1766,7 +1922,7 @@
             <a:r>
               <a:rPr lang="en-US" sz="1400">
                 <a:solidFill>
-                  <a:srgbClr val="dc2300"/>
+                  <a:srgbClr val="DC2300"/>
                 </a:solidFill>
                 <a:latin typeface="Corbel"/>
                 <a:ea typeface="Times New Roman"/>
@@ -1779,6 +1935,9 @@
       </p:sp>
     </p:spTree>
   </p:cSld>
+  <p:clrMapOvr>
+    <a:masterClrMapping/>
+  </p:clrMapOvr>
   <p:timing>
     <p:tnLst>
       <p:par>
@@ -1787,14 +1946,14 @@
             <p:seq>
               <p:cTn id="2" nodeType="mainSeq"/>
               <p:prevCondLst>
-                <p:cond delay="0" evt="onPrev">
+                <p:cond evt="onPrev" delay="0">
                   <p:tgtEl>
                     <p:sldTgt/>
                   </p:tgtEl>
                 </p:cond>
               </p:prevCondLst>
               <p:nextCondLst>
-                <p:cond delay="0" evt="onNext">
+                <p:cond evt="onNext" delay="0">
                   <p:tgtEl>
                     <p:sldTgt/>
                   </p:tgtEl>
@@ -2029,5 +2188,7 @@
       </a:bgFillStyleLst>
     </a:fmtScheme>
   </a:themeElements>
+  <a:objectDefaults/>
+  <a:extraClrSchemeLst/>
 </a:theme>
 </file>
</xml_diff>